<commit_message>
Enhance configuration and industry research slide generation by adding conversion factors for EMU and a continuation uplift parameter. Refactor placeholder handling to improve layout management and ensure valid data presence before removal.
</commit_message>
<xml_diff>
--- a/template/plantilla.pptx
+++ b/template/plantilla.pptx
@@ -262,7 +262,7 @@
           <a:p>
             <a:fld id="{936A42A0-BF9A-48CB-9C76-008251E2EC31}" type="datetimeFigureOut">
               <a:rPr lang="en-US" smtClean="0"/>
-              <a:t>8/11/2025</a:t>
+              <a:t>12/25/2025</a:t>
             </a:fld>
             <a:endParaRPr lang="en-US"/>
           </a:p>
@@ -460,7 +460,7 @@
           <a:p>
             <a:fld id="{936A42A0-BF9A-48CB-9C76-008251E2EC31}" type="datetimeFigureOut">
               <a:rPr lang="en-US" smtClean="0"/>
-              <a:t>8/11/2025</a:t>
+              <a:t>12/25/2025</a:t>
             </a:fld>
             <a:endParaRPr lang="en-US"/>
           </a:p>
@@ -668,7 +668,7 @@
           <a:p>
             <a:fld id="{936A42A0-BF9A-48CB-9C76-008251E2EC31}" type="datetimeFigureOut">
               <a:rPr lang="en-US" smtClean="0"/>
-              <a:t>8/11/2025</a:t>
+              <a:t>12/25/2025</a:t>
             </a:fld>
             <a:endParaRPr lang="en-US"/>
           </a:p>
@@ -866,7 +866,7 @@
           <a:p>
             <a:fld id="{936A42A0-BF9A-48CB-9C76-008251E2EC31}" type="datetimeFigureOut">
               <a:rPr lang="en-US" smtClean="0"/>
-              <a:t>8/11/2025</a:t>
+              <a:t>12/25/2025</a:t>
             </a:fld>
             <a:endParaRPr lang="en-US"/>
           </a:p>
@@ -1141,7 +1141,7 @@
           <a:p>
             <a:fld id="{936A42A0-BF9A-48CB-9C76-008251E2EC31}" type="datetimeFigureOut">
               <a:rPr lang="en-US" smtClean="0"/>
-              <a:t>8/11/2025</a:t>
+              <a:t>12/25/2025</a:t>
             </a:fld>
             <a:endParaRPr lang="en-US"/>
           </a:p>
@@ -1406,7 +1406,7 @@
           <a:p>
             <a:fld id="{936A42A0-BF9A-48CB-9C76-008251E2EC31}" type="datetimeFigureOut">
               <a:rPr lang="en-US" smtClean="0"/>
-              <a:t>8/11/2025</a:t>
+              <a:t>12/25/2025</a:t>
             </a:fld>
             <a:endParaRPr lang="en-US"/>
           </a:p>
@@ -1818,7 +1818,7 @@
           <a:p>
             <a:fld id="{936A42A0-BF9A-48CB-9C76-008251E2EC31}" type="datetimeFigureOut">
               <a:rPr lang="en-US" smtClean="0"/>
-              <a:t>8/11/2025</a:t>
+              <a:t>12/25/2025</a:t>
             </a:fld>
             <a:endParaRPr lang="en-US"/>
           </a:p>
@@ -1959,7 +1959,7 @@
           <a:p>
             <a:fld id="{936A42A0-BF9A-48CB-9C76-008251E2EC31}" type="datetimeFigureOut">
               <a:rPr lang="en-US" smtClean="0"/>
-              <a:t>8/11/2025</a:t>
+              <a:t>12/25/2025</a:t>
             </a:fld>
             <a:endParaRPr lang="en-US"/>
           </a:p>
@@ -2072,7 +2072,7 @@
           <a:p>
             <a:fld id="{936A42A0-BF9A-48CB-9C76-008251E2EC31}" type="datetimeFigureOut">
               <a:rPr lang="en-US" smtClean="0"/>
-              <a:t>8/11/2025</a:t>
+              <a:t>12/25/2025</a:t>
             </a:fld>
             <a:endParaRPr lang="en-US"/>
           </a:p>
@@ -2383,7 +2383,7 @@
           <a:p>
             <a:fld id="{936A42A0-BF9A-48CB-9C76-008251E2EC31}" type="datetimeFigureOut">
               <a:rPr lang="en-US" smtClean="0"/>
-              <a:t>8/11/2025</a:t>
+              <a:t>12/25/2025</a:t>
             </a:fld>
             <a:endParaRPr lang="en-US"/>
           </a:p>
@@ -2671,7 +2671,7 @@
           <a:p>
             <a:fld id="{936A42A0-BF9A-48CB-9C76-008251E2EC31}" type="datetimeFigureOut">
               <a:rPr lang="en-US" smtClean="0"/>
-              <a:t>8/11/2025</a:t>
+              <a:t>12/25/2025</a:t>
             </a:fld>
             <a:endParaRPr lang="en-US"/>
           </a:p>
@@ -2912,7 +2912,7 @@
           <a:p>
             <a:fld id="{936A42A0-BF9A-48CB-9C76-008251E2EC31}" type="datetimeFigureOut">
               <a:rPr lang="en-US" smtClean="0"/>
-              <a:t>8/11/2025</a:t>
+              <a:t>12/25/2025</a:t>
             </a:fld>
             <a:endParaRPr lang="en-US"/>
           </a:p>
@@ -3462,8 +3462,8 @@
         </p:nvSpPr>
         <p:spPr>
           <a:xfrm>
-            <a:off x="185928" y="1252728"/>
-            <a:ext cx="5818632" cy="5564124"/>
+            <a:off x="0" y="1106424"/>
+            <a:ext cx="6096000" cy="5637277"/>
           </a:xfrm>
           <a:prstGeom prst="rect">
             <a:avLst/>
@@ -3662,8 +3662,8 @@
         </p:nvSpPr>
         <p:spPr>
           <a:xfrm>
-            <a:off x="6096000" y="1252728"/>
-            <a:ext cx="5818632" cy="5564124"/>
+            <a:off x="6096000" y="1035776"/>
+            <a:ext cx="6096000" cy="5822223"/>
           </a:xfrm>
           <a:prstGeom prst="rect">
             <a:avLst/>
@@ -3901,12 +3901,144 @@
           </a:p>
         </p:txBody>
       </p:sp>
+      <p:sp>
+        <p:nvSpPr>
+          <p:cNvPr id="8" name="Rectangle 7">
+            <a:extLst>
+              <a:ext uri="{FF2B5EF4-FFF2-40B4-BE49-F238E27FC236}">
+                <a16:creationId xmlns:a16="http://schemas.microsoft.com/office/drawing/2014/main" id="{A3158A81-78C2-4EC7-4109-88139CCB1D47}"/>
+              </a:ext>
+            </a:extLst>
+          </p:cNvPr>
+          <p:cNvSpPr/>
+          <p:nvPr/>
+        </p:nvSpPr>
+        <p:spPr>
+          <a:xfrm>
+            <a:off x="191464" y="818827"/>
+            <a:ext cx="2709358" cy="433901"/>
+          </a:xfrm>
+          <a:prstGeom prst="rect">
+            <a:avLst/>
+          </a:prstGeom>
+        </p:spPr>
+        <p:style>
+          <a:lnRef idx="0">
+            <a:schemeClr val="dk1">
+              <a:alpha val="0"/>
+              <a:hueOff val="0"/>
+              <a:satOff val="0"/>
+              <a:lumOff val="0"/>
+              <a:alphaOff val="0"/>
+            </a:schemeClr>
+          </a:lnRef>
+          <a:fillRef idx="0">
+            <a:schemeClr val="lt1">
+              <a:alpha val="0"/>
+              <a:hueOff val="0"/>
+              <a:satOff val="0"/>
+              <a:lumOff val="0"/>
+              <a:alphaOff val="0"/>
+            </a:schemeClr>
+          </a:fillRef>
+          <a:effectRef idx="0">
+            <a:schemeClr val="lt1">
+              <a:alpha val="0"/>
+              <a:hueOff val="0"/>
+              <a:satOff val="0"/>
+              <a:lumOff val="0"/>
+              <a:alphaOff val="0"/>
+            </a:schemeClr>
+          </a:effectRef>
+          <a:fontRef idx="minor">
+            <a:schemeClr val="tx1">
+              <a:hueOff val="0"/>
+              <a:satOff val="0"/>
+              <a:lumOff val="0"/>
+              <a:alphaOff val="0"/>
+            </a:schemeClr>
+          </a:fontRef>
+        </p:style>
+        <p:txBody>
+          <a:bodyPr/>
+          <a:lstStyle/>
+          <a:p>
+            <a:endParaRPr lang="en-US"/>
+          </a:p>
+        </p:txBody>
+      </p:sp>
+      <p:sp>
+        <p:nvSpPr>
+          <p:cNvPr id="9" name="TextBox 8">
+            <a:extLst>
+              <a:ext uri="{FF2B5EF4-FFF2-40B4-BE49-F238E27FC236}">
+                <a16:creationId xmlns:a16="http://schemas.microsoft.com/office/drawing/2014/main" id="{F4E4B970-6BD1-A341-66DB-73590A881924}"/>
+              </a:ext>
+            </a:extLst>
+          </p:cNvPr>
+          <p:cNvSpPr txBox="1"/>
+          <p:nvPr/>
+        </p:nvSpPr>
+        <p:spPr>
+          <a:xfrm>
+            <a:off x="191464" y="745675"/>
+            <a:ext cx="2709358" cy="433901"/>
+          </a:xfrm>
+          <a:prstGeom prst="rect">
+            <a:avLst/>
+          </a:prstGeom>
+        </p:spPr>
+        <p:style>
+          <a:lnRef idx="0">
+            <a:scrgbClr r="0" g="0" b="0"/>
+          </a:lnRef>
+          <a:fillRef idx="0">
+            <a:scrgbClr r="0" g="0" b="0"/>
+          </a:fillRef>
+          <a:effectRef idx="0">
+            <a:scrgbClr r="0" g="0" b="0"/>
+          </a:effectRef>
+          <a:fontRef idx="minor">
+            <a:schemeClr val="tx1">
+              <a:hueOff val="0"/>
+              <a:satOff val="0"/>
+              <a:lumOff val="0"/>
+              <a:alphaOff val="0"/>
+            </a:schemeClr>
+          </a:fontRef>
+        </p:style>
+        <p:txBody>
+          <a:bodyPr spcFirstLastPara="0" vert="horz" wrap="square" lIns="137160" tIns="22860" rIns="22860" bIns="22860" numCol="1" spcCol="1270" anchor="t" anchorCtr="0">
+            <a:noAutofit/>
+          </a:bodyPr>
+          <a:lstStyle/>
+          <a:p>
+            <a:pPr marL="0" lvl="0" indent="0" algn="l" defTabSz="800100">
+              <a:lnSpc>
+                <a:spcPct val="100000"/>
+              </a:lnSpc>
+              <a:spcBef>
+                <a:spcPct val="0"/>
+              </a:spcBef>
+              <a:spcAft>
+                <a:spcPct val="35000"/>
+              </a:spcAft>
+              <a:buNone/>
+              <a:defRPr b="1"/>
+            </a:pPr>
+            <a:r>
+              <a:rPr lang="en-US" sz="1800" kern="1200" dirty="0"/>
+              <a:t>General</a:t>
+            </a:r>
+          </a:p>
+        </p:txBody>
+      </p:sp>
       <p:grpSp>
         <p:nvGrpSpPr>
-          <p:cNvPr id="7" name="Group 6">
-            <a:extLst>
-              <a:ext uri="{FF2B5EF4-FFF2-40B4-BE49-F238E27FC236}">
-                <a16:creationId xmlns:a16="http://schemas.microsoft.com/office/drawing/2014/main" id="{B36E7B32-1C11-8DB8-A134-52F196DA0110}"/>
+          <p:cNvPr id="10" name="Group 9">
+            <a:extLst>
+              <a:ext uri="{FF2B5EF4-FFF2-40B4-BE49-F238E27FC236}">
+                <a16:creationId xmlns:a16="http://schemas.microsoft.com/office/drawing/2014/main" id="{4A818146-7DDA-B6E4-6013-CDF68AA9E6A3}"/>
               </a:ext>
             </a:extLst>
           </p:cNvPr>
@@ -3915,160 +4047,7 @@
         </p:nvGrpSpPr>
         <p:grpSpPr>
           <a:xfrm>
-            <a:off x="191464" y="818827"/>
-            <a:ext cx="2709358" cy="433901"/>
-            <a:chOff x="0" y="12769"/>
-            <a:chExt cx="2709358" cy="433901"/>
-          </a:xfrm>
-        </p:grpSpPr>
-        <p:sp>
-          <p:nvSpPr>
-            <p:cNvPr id="8" name="Rectangle 7">
-              <a:extLst>
-                <a:ext uri="{FF2B5EF4-FFF2-40B4-BE49-F238E27FC236}">
-                  <a16:creationId xmlns:a16="http://schemas.microsoft.com/office/drawing/2014/main" id="{A3158A81-78C2-4EC7-4109-88139CCB1D47}"/>
-                </a:ext>
-              </a:extLst>
-            </p:cNvPr>
-            <p:cNvSpPr/>
-            <p:nvPr/>
-          </p:nvSpPr>
-          <p:spPr>
-            <a:xfrm>
-              <a:off x="0" y="12769"/>
-              <a:ext cx="2709358" cy="433901"/>
-            </a:xfrm>
-            <a:prstGeom prst="rect">
-              <a:avLst/>
-            </a:prstGeom>
-          </p:spPr>
-          <p:style>
-            <a:lnRef idx="0">
-              <a:schemeClr val="dk1">
-                <a:alpha val="0"/>
-                <a:hueOff val="0"/>
-                <a:satOff val="0"/>
-                <a:lumOff val="0"/>
-                <a:alphaOff val="0"/>
-              </a:schemeClr>
-            </a:lnRef>
-            <a:fillRef idx="0">
-              <a:schemeClr val="lt1">
-                <a:alpha val="0"/>
-                <a:hueOff val="0"/>
-                <a:satOff val="0"/>
-                <a:lumOff val="0"/>
-                <a:alphaOff val="0"/>
-              </a:schemeClr>
-            </a:fillRef>
-            <a:effectRef idx="0">
-              <a:schemeClr val="lt1">
-                <a:alpha val="0"/>
-                <a:hueOff val="0"/>
-                <a:satOff val="0"/>
-                <a:lumOff val="0"/>
-                <a:alphaOff val="0"/>
-              </a:schemeClr>
-            </a:effectRef>
-            <a:fontRef idx="minor">
-              <a:schemeClr val="tx1">
-                <a:hueOff val="0"/>
-                <a:satOff val="0"/>
-                <a:lumOff val="0"/>
-                <a:alphaOff val="0"/>
-              </a:schemeClr>
-            </a:fontRef>
-          </p:style>
-          <p:txBody>
-            <a:bodyPr/>
-            <a:lstStyle/>
-            <a:p>
-              <a:endParaRPr lang="en-US"/>
-            </a:p>
-          </p:txBody>
-        </p:sp>
-        <p:sp>
-          <p:nvSpPr>
-            <p:cNvPr id="9" name="TextBox 8">
-              <a:extLst>
-                <a:ext uri="{FF2B5EF4-FFF2-40B4-BE49-F238E27FC236}">
-                  <a16:creationId xmlns:a16="http://schemas.microsoft.com/office/drawing/2014/main" id="{F4E4B970-6BD1-A341-66DB-73590A881924}"/>
-                </a:ext>
-              </a:extLst>
-            </p:cNvPr>
-            <p:cNvSpPr txBox="1"/>
-            <p:nvPr/>
-          </p:nvSpPr>
-          <p:spPr>
-            <a:xfrm>
-              <a:off x="0" y="12769"/>
-              <a:ext cx="2709358" cy="433901"/>
-            </a:xfrm>
-            <a:prstGeom prst="rect">
-              <a:avLst/>
-            </a:prstGeom>
-          </p:spPr>
-          <p:style>
-            <a:lnRef idx="0">
-              <a:scrgbClr r="0" g="0" b="0"/>
-            </a:lnRef>
-            <a:fillRef idx="0">
-              <a:scrgbClr r="0" g="0" b="0"/>
-            </a:fillRef>
-            <a:effectRef idx="0">
-              <a:scrgbClr r="0" g="0" b="0"/>
-            </a:effectRef>
-            <a:fontRef idx="minor">
-              <a:schemeClr val="tx1">
-                <a:hueOff val="0"/>
-                <a:satOff val="0"/>
-                <a:lumOff val="0"/>
-                <a:alphaOff val="0"/>
-              </a:schemeClr>
-            </a:fontRef>
-          </p:style>
-          <p:txBody>
-            <a:bodyPr spcFirstLastPara="0" vert="horz" wrap="square" lIns="137160" tIns="22860" rIns="22860" bIns="22860" numCol="1" spcCol="1270" anchor="t" anchorCtr="0">
-              <a:noAutofit/>
-            </a:bodyPr>
-            <a:lstStyle/>
-            <a:p>
-              <a:pPr marL="0" lvl="0" indent="0" algn="l" defTabSz="800100">
-                <a:lnSpc>
-                  <a:spcPct val="100000"/>
-                </a:lnSpc>
-                <a:spcBef>
-                  <a:spcPct val="0"/>
-                </a:spcBef>
-                <a:spcAft>
-                  <a:spcPct val="35000"/>
-                </a:spcAft>
-                <a:buNone/>
-                <a:defRPr b="1"/>
-              </a:pPr>
-              <a:r>
-                <a:rPr lang="en-US" sz="1800" kern="1200" dirty="0"/>
-                <a:t>General</a:t>
-              </a:r>
-            </a:p>
-          </p:txBody>
-        </p:sp>
-      </p:grpSp>
-      <p:grpSp>
-        <p:nvGrpSpPr>
-          <p:cNvPr id="10" name="Group 9">
-            <a:extLst>
-              <a:ext uri="{FF2B5EF4-FFF2-40B4-BE49-F238E27FC236}">
-                <a16:creationId xmlns:a16="http://schemas.microsoft.com/office/drawing/2014/main" id="{4A818146-7DDA-B6E4-6013-CDF68AA9E6A3}"/>
-              </a:ext>
-            </a:extLst>
-          </p:cNvPr>
-          <p:cNvGrpSpPr/>
-          <p:nvPr/>
-        </p:nvGrpSpPr>
-        <p:grpSpPr>
-          <a:xfrm>
-            <a:off x="6095070" y="818827"/>
+            <a:off x="6096000" y="741542"/>
             <a:ext cx="2709358" cy="433901"/>
             <a:chOff x="7977842" y="0"/>
             <a:chExt cx="2709358" cy="433901"/>
@@ -4253,8 +4232,8 @@
         </p:nvSpPr>
         <p:spPr>
           <a:xfrm>
-            <a:off x="182880" y="1097280"/>
-            <a:ext cx="11905488" cy="5760720"/>
+            <a:off x="0" y="658368"/>
+            <a:ext cx="12192000" cy="6199632"/>
           </a:xfrm>
           <a:prstGeom prst="rect">
             <a:avLst/>
@@ -4431,10 +4410,9 @@
           <a:p>
             <a:pPr algn="l"/>
             <a:r>
-              <a:rPr lang="en-US"/>
+              <a:rPr lang="en-US" dirty="0"/>
               <a:t>{{CompanyResearch3}}</a:t>
             </a:r>
-            <a:endParaRPr lang="en-US" dirty="0"/>
           </a:p>
         </p:txBody>
       </p:sp>

</xml_diff>